<commit_message>
App changes but it's still not working right.
</commit_message>
<xml_diff>
--- a/uploads/translated_Vox_PopulAI_Lessons_from_a_global_law_firm_s_explo_summary_2025-05-01.pptx
+++ b/uploads/translated_Vox_PopulAI_Lessons_from_a_global_law_firm_s_explo_summary_2025-05-01.pptx
@@ -5410,7 +5410,7 @@
           </a:p>
           <a:p>
             <a:r>
-              <a:t>概要: 「Vox_PopulAI__Lessons_from_a_global_law_firms_exploration_of_generative_AI.pdf」</a:t>
+              <a:t>Résumé : 'Vox_PopulAI__Leçons_tirées_de_l'exploration_de_l'IA_générative_par_un_cabinet_d'avocats_international.pdf'</a:t>
             </a:r>
           </a:p>
         </p:txBody>
@@ -5434,8 +5434,7 @@
           </a:p>
           <a:p>
             <a:r>
-              <a:t>申し訳ありませんが、ドキュメント自体にアクセスできないため、PDF ドキュメントの内容を翻訳することはできません。
-もし、ドキュメントの一部（例えば、特定の段落や文）を共有していただければ、翻訳のお手伝いをすることができます。</a:t>
+              <a:t>Please provide the text you would like me to translate from the PDF "Vox_PopulAI__Lessons_from_a_global_law_firms_exploration_of_generative_AI.pdf". I need the English text to provide an accurate French translation.</a:t>
             </a:r>
           </a:p>
         </p:txBody>
@@ -5475,7 +5474,12 @@
           <a:p/>
           <a:p>
             <a:r>
-              <a:t>結論：誇大広告の先へ - 実世界からの考察</a:t>
+              <a:t>Here are a few options for translating "Conclusion: Beyond the Hype – Real-World Insights" into French, with slightly different nuances:
+*   **Conclusion : Au-delà du battage médiatique – Réflexions issues du monde réel** (This is a good general translation, using "réflexions" which can imply insights and considerations.)
+*   **Conclusion : Au-delà du buzz – Aperçus concrets** (This option is a bit more informal, using "buzz" for "hype" and "aperçus" for insights. It emphasizes the practical side.)
+*   **Conclusion : Démystifier le phénomène – Analyse du monde réel** (This translation uses "démystifier" to capture the idea of moving beyond the hype and adds "analyse" to highlight an analytical approach.)
+*   **Conclusion : Plus loin que l'engouement – Perspectives concrètes** (Similar to the second option but using "engouement" for hype which is more formal than "buzz".)
+The best choice depends on the specific context and the tone you want to convey. If you want something formal and informative, the first or third option might be best. If you want something more punchy and relatable, the second option could work well.</a:t>
             </a:r>
           </a:p>
         </p:txBody>
@@ -5497,11 +5501,23 @@
           <a:p/>
           <a:p>
             <a:r>
-              <a:t>アシャーストの試みは、GenAIの可能性と限界について貴重な洞察をもたらし、誇大広告から現実世界のアプリケーションへと移行しました。
-試行は答えよりも多くの疑問を生み出しましたが、貴重な洞察を提供しました。
-測定可能なデータに基づいた投資決定。
-スタッフの賛同を得るためには、経験主導のアプローチが不可欠。
-ユーザーのニーズと、ユーザーがGenAIをどのように使用したいかを理解することに焦点を当てる。</a:t>
+              <a:t>Here are a few options for translating the provided text, with slight variations to emphasize different aspects:
+**Option 1 (General and Balanced):**
+&gt; Les essais d'Ashurst ont fourni des informations précieuses sur le potentiel et les limites de l'IA générative, permettant de dépasser le battage médiatique pour se concentrer sur des applications concrètes. Les essais ont soulevé plus de questions que de réponses, mais ont néanmoins apporté des éclaircissements précieux. Des décisions d'investissement basées sur des données mesurables. Une approche axée sur l'expérience s'avère cruciale pour l'adhésion du personnel. Se concentrer sur la compréhension des besoins des utilisateurs et de la manière dont ils souhaitent utiliser l'IA générative.
+**Option 2 (Emphasizing Practicality):**
+&gt; Les tests d'Ashurst ont offert des aperçus importants sur le potentiel et les limites de l'IA générative, en allant au-delà du simple engouement pour examiner ses applications pratiques.  Ces tests ont généré plus de questions que de réponses, mais ont permis d'acquérir des connaissances précieuses. Des décisions d'investissement fondées sur des données quantifiables. Une approche basée sur l'expérience est essentielle pour obtenir l'adhésion des employés. Priorité à la compréhension des besoins des utilisateurs et à la façon dont ils envisagent d'utiliser l'IA générative.
+**Option 3 (Slightly More Formal):**
+&gt; Les expérimentations menées par Ashurst ont permis de recueillir des informations précieuses quant au potentiel et aux limites de l'IA générative, permettant ainsi de dépasser les simples effets d'annonce pour se concentrer sur des applications réelles. Bien que les expérimentations aient soulevé davantage de questions qu'elles n'ont apporté de réponses, elles ont néanmoins permis d'acquérir des éclaircissements pertinents. Les décisions d'investissement sont fondées sur des données mesurables. Il est essentiel d'adopter une approche axée sur l'expérience pour obtenir l'adhésion du personnel. Il est primordial de comprendre les besoins des utilisateurs et la manière dont ils envisagent d'utiliser l'IA générative.
+**Key considerations and vocabulary choices:**
+*   **GenAI:** I've used "IA générative" (Intelligence Artificielle générative) which is the standard French translation.
+*   **Trials:**  "Essais," "tests," and "expérimentations" are all possible, depending on the context.  "Essais" and "tests" are generally good choices. "Expérimentations" emphasizes the scientific nature.
+*   **Insights:** "Informations précieuses," "aperçus importants," "éclaircissements pertinents" all work well to translate the meaning. The best choice depends on the desired tone.
+*   **Hype:** "Battage médiatique" is the most common translation for "hype". "Effets d'annonce" is more formal.
+*   **Real-world applications:** "Applications concrètes," "applications pratiques," and "applications réelles" are all suitable.
+*   **Measurable data:** "Données mesurables" or "données quantifiables" are both good.
+*   **Experience-led approach:** "Approche axée sur l'expérience" or "approche basée sur l'expérience" are both correct.
+*   **Staff buy-in:** "Adhésion du personnel" or "adhésion des employés" are common and appropriate.
+Choose the option that best suits the tone and context of your overall document. Remember to consider your target audience when making your final selection.</a:t>
             </a:r>
           </a:p>
         </p:txBody>
@@ -5551,7 +5567,18 @@
           </a:p>
           <a:p>
             <a:r>
-              <a:t>効果的にGenAIツールを使用する弁護士を描いた画像。</a:t>
+              <a:t>Here are a few options, depending on the nuance you want to convey:
+**Option 1 (Most straightforward):**
+*   **Suggestion de visuel:** Image représentant un avocat utilisant efficacement des outils d'IA générative.
+**Option 2 (Slightly more formal):**
+*   **Visuel suggéré:** Image illustrant un avocat utilisant avec efficacité des outils d'IA générative.
+**Option 3 (Emphasizing the impact of GenAI):**
+*   **Visuel suggéré:** Image d'un avocat tirant parti des outils d'IA générative.
+**Which one is best?**
+*   Option 1 is the simplest and most common.
+*   Option 2 is a bit more polished.
+*   Option 3 emphasizes the benefit of using GenAI.
+I would recommend **Option 1** unless you have a specific reason to prefer one of the others.</a:t>
             </a:r>
           </a:p>
         </p:txBody>
@@ -5580,7 +5607,20 @@
           <a:p/>
           <a:p>
             <a:r>
-              <a:t>申し訳ありませんが、翻訳する英文が提供されていません。翻訳したい英文を教えてください。</a:t>
+              <a:t>Here are a few options for translating "Generated by AI Presentation Builder," depending on the specific context and nuance you want to convey:
+**Most Common and Literal:**
+*   **Généré par l'IA de l'outil de présentation.** (This is a good, straightforward translation.)
+**More Formal:**
+*   **Créé par l'IA de l'outil de présentation.** (Uses "Créé" which means "created" and can sound slightly more polished.)
+**Emphasis on AI:**
+*   **Généré par une intelligence artificielle pour la création de présentations.** (Highlights the fact that an artificial intelligence was involved in the generation of the content.)
+**Shorter and more succinct**
+* **Généré par IA pour présentations.**
+**Choosing the Best Option:**
+*   **Consider the overall tone of your presentation.**  If it's formal, "Créé par l'IA de l'outil de présentation" or "Généré par une intelligence artificielle pour la création de présentations" might be better.
+*   **Think about the audience.**  If you're presenting to a technical audience, they might appreciate the detail of specifying that it's an artificial intelligence.
+*   **For most situations, "Généré par l'IA de l'outil de présentation" will be perfectly acceptable.**
+I recommend "Généré par l'IA de l'outil de présentation" unless you have a specific reason to choose one of the others.</a:t>
             </a:r>
           </a:p>
         </p:txBody>
@@ -5609,7 +5649,7 @@
           <a:p/>
           <a:p>
             <a:r>
-              <a:t>10 (じゅう)</a:t>
+              <a:t>Dix</a:t>
             </a:r>
           </a:p>
         </p:txBody>
@@ -5649,7 +5689,12 @@
           <a:p/>
           <a:p>
             <a:r>
-              <a:t>アシャーストの生成AI試験：概要</a:t>
+              <a:t>Here are a few options for translating "Ashurst's Generative AI Trials: An Overview," depending on the nuance you want to convey:
+*   **Essais d'IA générative d'Ashurst : Un aperçu** (This is the most direct and literal translation.)
+*   **Tests d'IA générative chez Ashurst : Une vue d'ensemble** (Using "Tests" might be more accurate if these are indeed controlled tests.)
+*   **Expérimentations d'IA générative chez Ashurst : Présentation générale** (Using "Expérimentations" emphasizes the exploratory nature of the trials.)
+*   **L'IA générative à l'épreuve chez Ashurst : Un aperçu** (This is a more idiomatic approach, suggesting that Ashurst is "putting generative AI to the test.")
+The best option depends on the specific context. If it's a formal document, the first option ("Essais... Un aperçu") is suitable. If you want to emphasize the experimental nature, the third option ("Expérimentations... Présentation générale") is preferable.</a:t>
             </a:r>
           </a:p>
         </p:txBody>
@@ -5671,11 +5716,12 @@
           <a:p/>
           <a:p>
             <a:r>
-              <a:t>アシャースト（Ashurst）のグローバルな生成AIトライアルは、法律分野におけるこのテクノロジーの可能性と限界について貴重な洞察をもたらしました。
-*   23箇所のオフィスにいる411名のパートナー、弁護士、およびスタッフが参加した3つのグローバルなトライアルを実施。
-*   トライアルは、GenAIが仕事や顧客サービスに与える影響を理解し、測定することに焦点を当てて実施。
-*   データセキュリティを確保するために、公開されているデータと厳格な安全対策を利用。
-*   トライアルから5つの重要な洞察が得られました。</a:t>
+              <a:t>Voici une traduction du texte en français :
+Les essais mondiaux d'Ashurst en matière d'IA générative ont permis d'obtenir des informations précieuses sur le potentiel et les limites de cette technologie dans le domaine juridique.
+Trois essais mondiaux impliquant 411 associés, avocats et employés dans 23 bureaux.
+Les essais étaient axés sur la compréhension et la mesure de l'impact de l'IA générative sur le travail et le service à la clientèle.
+Utilisation de données accessibles au public et de mesures de protection rigoureuses pour garantir la sécurité des données.
+Cinq principaux enseignements se sont dégagés des essais.</a:t>
             </a:r>
           </a:p>
         </p:txBody>
@@ -5725,8 +5771,20 @@
           </a:p>
           <a:p>
             <a:r>
-              <a:t>提案するビジュアル：
-アシューストの本社所在地をハイライトした世界地図の画像</a:t>
+              <a:t>Here are a few options for translating "Suggested Visual: Image of a global map highlighting Ashurst's office locations," depending on the specific context and desired tone:
+**Option 1 (Most literal and straightforward):**
+*   **Visuel suggéré : Image d'une carte du monde mettant en évidence les implantations des bureaux d'Ashurst.**
+**Option 2 (Slightly more formal):**
+*   **Proposition de visuel : Image d'une carte du monde indiquant les emplacements des bureaux d'Ashurst.**
+**Option 3 (Emphasis on the map as a visual aid):**
+*   **Visuel à envisager : Carte du monde illustrant l'implantation géographique des bureaux d'Ashurst.**
+**Option 4 (Focus on what the map *shows*):**
+*   **Visuel proposé : Carte du monde présentant la répartition géographique des bureaux d'Ashurst.**
+**Which one is best depends on the context:**
+*   If it's a technical document or a document where brevity is important, **Option 1** is fine.
+*   If you want a slightly more professional tone, **Option 2** is a good choice.
+*   If you want to emphasize the function of the map (to show where Ashurst's offices are), **Option 3** or **Option 4** is preferable.
+Therefore, I would recommend **Option 1** as a safe and generally applicable translation. However, consider the nuance you want to convey and choose the one that best fits your needs.</a:t>
             </a:r>
           </a:p>
         </p:txBody>
@@ -5755,17 +5813,12 @@
           <a:p/>
           <a:p>
             <a:r>
-              <a:t>「Generated by AI Presentation Builder」
-これは状況によって、以下のように訳すことができます。
-* **シンプルに意味を伝える場合:**
-  * AIによるプレゼンテーション作成ツールで生成
-* **ツールの名前を強調する場合:**
-  * AIプレゼンテーションビルダーで生成
-* **もう少し詳細に説明する場合:**
-  * AIが作成したプレゼンテーションビルダーによって生成
-* **キャッチーな表現にしたい場合:**
-  * AIが自動生成したプレゼンテーション
-文脈や伝えたいニュアンスによって使い分けてみてください。</a:t>
+              <a:t>Here are a few options for translating "Generated by AI Presentation Builder," depending on the specific nuance you want to convey:
+*   **Généré par AI Presentation Builder:** (Most literal and straightforward. Good for a technical context.)
+*   **Produit par AI Presentation Builder:** (Emphasizes the presentation as a final product.)
+*   **Créé par AI Presentation Builder:** (Emphasizes the act of creation.)
+*   **Réalisé avec AI Presentation Builder:** (Emphasizes the tool used to make the presentation.)
+The best option depends on the specific context of your presentation. I would lean towards **"Généré par AI Presentation Builder"** as it is the most common and widely understood translation.</a:t>
             </a:r>
           </a:p>
         </p:txBody>
@@ -5834,7 +5887,17 @@
           <a:p/>
           <a:p>
             <a:r>
-              <a:t>GenAI：初稿作成の効率向上</a:t>
+              <a:t>Here are a few options for translating "GenAI: Increased Efficiency in First Draft Creation," depending on the specific nuance you want to convey:
+**More Literal &amp; Straightforward:**
+*   **IA générative : Efficacité accrue dans la création de la première ébauche** (This is a good, clear option.)
+**Emphasizing Speed &amp; Productivity:**
+*   **IA générative : Gain d'efficacité pour la rédaction du premier jet** (This highlights the "gain" in efficiency.)
+**Highlighting Automation:**
+*   **IA générative : Automatisation accrue de la première rédaction** (This emphasizes the automation aspect.)
+**More Formal/Professional:**
+*   **IA générative : Amélioration de l'efficacité dans la production des premières versions** (This sounds slightly more formal.)
+**Recommendation:**
+I would recommend **"IA générative : Efficacité accrue dans la création de la première ébauche"** as the most generally applicable and accurate translation.</a:t>
             </a:r>
           </a:p>
         </p:txBody>
@@ -5856,10 +5919,23 @@
           <a:p/>
           <a:p>
             <a:r>
-              <a:t>生成AIは一次草稿の作成を大幅にスピードアップさせ、弁護士の効率を向上させます。
-調査回答者の平均77%が、生成AIが一次草稿の迅速な作成に役立つと回答しました。
-時間短縮効果: 80% (英国企業ファイリング)、59% (業界調査レポート)、45% (法務概要)。
-法務以外のコンテンツでは、参加者一人あたりタスクごとに最大2時間の節約が見られました。</a:t>
+              <a:t>Here are a few options for the translation, with slightly different nuances, and explanations of why I chose them:
+**Option 1 (More literal and direct):**
+"L'IA générative accélère considérablement la création des premières ébauches, améliorant ainsi l'efficacité des avocats. En moyenne, 77 % des personnes interrogées s'accordent à dire que l'IA générative a contribué à accélérer la création des premières ébauches. Gains de temps : 80 % (documents administratifs d'entreprises au Royaume-Uni), 59 % (rapports d'études de marché), 45 % (notes d'information juridiques). Le contenu non juridique a permis de gagner jusqu'à 2 heures par participant et par tâche."
+*   **Why:** This option is very close to the English original. It's clear and easy to understand.
+**Option 2 (Slightly more natural and flowing):**
+"L'IA générative accélère de manière significative la rédaction des premières versions, ce qui améliore l'efficacité des avocats. Une moyenne de 77 % des participants à l'enquête ont reconnu que l'IA générative les avait aidés à rédiger plus rapidement les premières versions. Gains de temps constatés : 80 % pour les documents administratifs d'entreprises au Royaume-Uni, 59 % pour les rapports d'études de marché et 45 % pour les notes d'information juridiques. La production de contenu non juridique a permis d'économiser jusqu'à 2 heures par participant et par tâche."
+*   **Why:** This option uses slightly more idiomatic phrasing. "Rédaction des premières versions" sounds a bit more natural than "création des premières ébauches."  "Gains de temps constatés" also feels slightly more natural.
+**Option 3 (Emphasis on benefits):**
+"L'IA générative est un atout considérable pour accélérer la création des premières ébauches, optimisant ainsi l'efficacité des avocats. Il ressort d'une enquête que 77 % des répondants estiment en moyenne que l'IA générative a facilité la production plus rapide des premières versions. Les gains de temps sont notables : 80 % pour les documents administratifs des entreprises britanniques, 59 % pour les rapports d'études sectorielles et 45 % pour les notes d'information juridiques. La création de contenu non juridique a permis d'économiser jusqu'à 2 heures par tâche et par participant."
+*   **Why:** This option is a little more proactive in stating the impact of generative AI.  The phrase "Un atout considérable" frames the tool in a more positive light.
+**Key Considerations &amp; Explanations of Choices:**
+*   **"Generative AI":** The best translation is "IA générative."
+*   **"First drafts":**  "Premières ébauches" or "premières versions" are both good. I lean towards "premières versions" for a smoother sound. "Premières versions" also better implies that the draft is usable and of better quality.
+*   **"Survey respondents":** "Personnes interrogées" or "participants à l'enquête" are both correct.
+*   **"Time savings":** "Gains de temps" is the standard and most natural translation. "Économies de temps" would also work, but "gains de temps" is preferred.
+*   **Specificity:** Preserving the details (e.g., "UK corporate filings") is crucial for accuracy.
+Ultimately, the best translation depends on the specific context and the intended audience.  I would recommend Option 2 as a strong balance between accuracy and naturalness.</a:t>
             </a:r>
           </a:p>
         </p:txBody>
@@ -5909,8 +5985,17 @@
           </a:p>
           <a:p>
             <a:r>
-              <a:t>提案するビジュアル：
-ドキュメントの種類ごとの時間短縮量を比較した棒グラフ</a:t>
+              <a:t>**Here are a few options, depending on the nuance you want to convey:**
+*   **Option 1 (Most straightforward):** Suggestion visuelle : Diagramme à barres comparant les gains de temps selon les types de documents.
+*   **Option 2 (More descriptive):** Suggestion visuelle : Un diagramme à barres illustrant les gains de temps pour différents types de documents.
+*   **Option 3 (Emphasizing purpose):** Suggestion visuelle : Diagramme à barres comparatif mettant en évidence les gains de temps pour différents types de documents.
+**Explanation of Choices:**
+*   "Diagramme à barres" is the standard French translation for "bar chart."
+*   "Comparant" means "comparing."
+*   "Selon les types de documents" or "pour différents types de documents" both mean "across different document types" or "for different document types."
+*   "Illustrant" means "illustrating"
+*   "Mettant en évidence" means "highlighting" or "emphasizing"
+I would recommend **Option 1** as the most direct and generally useful translation.</a:t>
             </a:r>
           </a:p>
         </p:txBody>
@@ -5939,7 +6024,7 @@
           <a:p/>
           <a:p>
             <a:r>
-              <a:t>申し訳ありませんが、元の文章が提供されていません。翻訳したい英語の文章を教えていただければ、日本語に翻訳します。</a:t>
+              <a:t>Please provide the text you want me to translate. I need the English text from the AI Presentation Builder to translate it into French.</a:t>
             </a:r>
           </a:p>
         </p:txBody>
@@ -5968,7 +6053,7 @@
           <a:p/>
           <a:p>
             <a:r>
-              <a:t>3</a:t>
+              <a:t>Trois</a:t>
             </a:r>
           </a:p>
         </p:txBody>
@@ -6008,10 +6093,21 @@
           <a:p/>
           <a:p>
             <a:r>
-              <a:t>正確な場合、GenAIの出力は人間の出力と区別することが難しい。
-あるいは、より自然な言い方としては：
-正確なGenAIの出力は、人間が書いたものと見分けがつかないほどである。
-どちらの訳も、元の英文の意味を正確に伝えています。文脈によって使い分けるのが良いでしょう。</a:t>
+              <a:t>Here are a few options for translating "GenAI Output: Difficult to Distinguish from Human Output (When Accurate)" into French, with slightly different nuances:
+**Option 1 (Most Direct):**
+*   **Sortie de l'IA générative : Difficile à distinguer d'une production humaine (lorsqu'elle est précise).**
+    *   This is the most literal and straightforward translation. It's a good general choice.
+**Option 2 (Emphasis on the Quality):**
+*   **Production de l'IA générative : Difficilement discernable d'une production humaine (quand elle est exacte/pertinente).**
+    *   "Difficilement discernable" is slightly more sophisticated than "difficile à distinguer."
+    *   You could also use "pertinente" instead of "exacte" to highlight the relevance of the output.
+**Option 3 (More Common Language):**
+*   **Résultat de l'IA générative : On a du mal à faire la différence avec une production humaine (quand c'est exact/correct).**
+    *   This option uses a more common expression ("On a du mal à faire la différence") which is less formal.  "Correct" could also be used instead of "exact."
+**Option 4 (If the context is primarily about text generation):**
+*   **Texte généré par l'IA : Difficile à différencier d'un texte écrit par un humain (quand il est exact).**
+    *   This is suitable if you're specifically talking about text generation.
+**Which option is best depends on the specific context and target audience.** If you need something very formal and technical, Option 1 is a safe bet. If you want something more natural and conversational, Option 3 might be better. If you are talking about text, option 4 is the best.</a:t>
             </a:r>
           </a:p>
         </p:txBody>
@@ -6033,10 +6129,11 @@
           <a:p/>
           <a:p>
             <a:r>
-              <a:t>法的に正確な場合、GenAIによって生成された法的コンテンツは、人間が生成したコンテンツと区別がつかないことが多い。
-GenAIの出力の50%は、人間が作成したものと誤認されたり、区別がつかなかったりした。
-GenAIの正確性スコアは1～4/5の範囲であったのに対し、人間のスコアは3～4/5の範囲であった。
-GenAIの正確性スコアの平均：3/5、人間の平均：3.5/5。</a:t>
+              <a:t>Here's a translation of the text into French:
+**Lorsque juridiquement précis, le contenu juridique généré par l'IA générative est souvent indiscernable du contenu produit par un humain.**
+**50 % des résultats de l'IA générative ont été identifiés à tort comme produits par des humains ou n'ont pas pu être distingués.**
+**Les scores de précision de l'IA générative variaient de 1 à 4/5, tandis que les scores humains variaient de 3 à 4/5.**
+**Score de précision moyen de l'IA générative : 3/5 ; moyenne humaine : 3,5/5.**</a:t>
             </a:r>
           </a:p>
         </p:txBody>
@@ -6086,8 +6183,13 @@
           </a:p>
           <a:p>
             <a:r>
-              <a:t>提案するビジュアル：
-GenAI (生成AI) と人間が生成したコンテンツの正確性スコアを比較した表</a:t>
+              <a:t>Traduction :
+**Visuel suggéré :**
+Un tableau comparatif présentant les scores de précision du contenu généré par l'IA générative et du contenu produit par des humains.
+Alternatively, you could also say:
+**Visuel suggéré :**
+Tableau comparatif illustrant les scores de précision du contenu généré par l'IA et du contenu rédigé par des humains.
+The best option depends on the specific nuance you want to convey. The first option emphasizes the "generative" aspect of the AI, while the second is slightly more concise and focuses on the general comparison between AI and human content.</a:t>
             </a:r>
           </a:p>
         </p:txBody>
@@ -6116,7 +6218,14 @@
           <a:p/>
           <a:p>
             <a:r>
-              <a:t>申し訳ありませんが、翻訳したい英語のテキストを提供していただけますか？テキストがないと翻訳できません。</a:t>
+              <a:t>The translation of "Generated by AI Presentation Builder" depends on the context and the nuance you want to convey. Here are a few options:
+**Most Direct and Common:**
+*   **Généré par le générateur de présentations IA** (This is the most literal and likely the best choice for general use. "IA" is the standard abbreviation for "Intelligence Artificielle" in French.)
+**Slightly More Natural (emphasizing the result):**
+*   **Présentation générée par un générateur d'IA** (This emphasizes that *the presentation itself* was generated by AI, which can be helpful if the context is all about the presentation).
+**More Descriptive (if you want to highlight the technology):**
+*   **Créé avec un générateur de présentations basé sur l'IA** (This translates to "Created with an AI-based presentation generator," which might be useful if the AI aspect is important to highlight).
+**Which one to use depends on the specific context of your presentation.** If in doubt, the first option ("Généré par le générateur de présentations IA") is the safest.</a:t>
             </a:r>
           </a:p>
         </p:txBody>
@@ -6145,7 +6254,8 @@
           <a:p/>
           <a:p>
             <a:r>
-              <a:t>4</a:t>
+              <a:t>The translation of "4" from English to French is:
+**4** (pronounced "quatre")</a:t>
             </a:r>
           </a:p>
         </p:txBody>
@@ -6185,7 +6295,22 @@
           <a:p/>
           <a:p>
             <a:r>
-              <a:t>法的な生成AIの出力における「品質」の定義</a:t>
+              <a:t>Here are a few possible translations of "Defining 'Quality' in Legal GenAI Output," depending on the nuance you want to convey:
+**More literal translations:**
+*   **Définir la "Qualité" dans les Résultats de l'IA Générative Juridique** (This is a very direct translation, using quotation marks to highlight "Quality")
+*   **Définir la Qualité des Résultats de l'IA Générative Juridique** (Slightly more natural flow, but still quite literal)
+**More nuanced translations:**
+*   **Définir ce qu'est la "Qualité" dans les Résultats de l'IA Générative Juridique** (This emphasizes the *process* of defining quality.)
+*   **Qu'est-ce que la "Qualité" dans les Résultats de l'IA Générative Juridique ?** (This frames it as a question to be explored.)
+*   **Comment définir la "Qualité" dans les Résultats de l'IA Générative Juridique ?** (Similar to the previous one, focusing on the "how" of defining quality.)
+*   **Les Critères de "Qualité" pour les Résultats de l'IA Générative Juridique** (This focuses on the criteria or standards used to determine quality.)
+**More professional/technical translations (emphasizing standards):**
+*   **Normes de "Qualité" pour les Résultats de l'IA Générative Juridique** (Emphasizes established norms or standards.)
+*   **Assurance Qualité des Résultats de l'IA Générative Juridique** (This refers to the process of ensuring quality.)
+**Which translation is best depends on the context.** If you are simply stating the topic of a paper or discussion, the more literal translations work well. If you are exploring the concept more deeply, the more nuanced translations might be more appropriate. If it's about setting quality standards, then the professional/technical translations would be best.
+**Therefore, I recommend using:**
+*   **Définir la Qualité des Résultats de l'IA Générative Juridique** - if you want a general, straightforward translation.
+If you can provide more context about how this phrase is used, I can offer an even better translation.</a:t>
             </a:r>
           </a:p>
         </p:txBody>
@@ -6207,10 +6332,16 @@
           <a:p/>
           <a:p>
             <a:r>
-              <a:t>GenAIによる法務関連のアウトプットの質を評価するには、客観的な指標と主観的な指標の両方が必要です。
-質は多面的であり、客観的要因と主観的要因によって左右されます。
-専門家パネルは、法務関連のアウトプットを評価する際（文法、網羅性、語彙など）、さまざまな好みを持ちました。
-「許容範囲内のエラー」に対する許容度は参加者によって異なり、質評価の主観的な性質が浮き彫りになりました。</a:t>
+              <a:t>Voici une traduction possible du texte en français :
+**Évaluer la qualité des productions juridiques de l'IA générative nécessite des mesures à la fois objectives et subjectives.**
+**La qualité est multidimensionnelle et influencée par des facteurs objectifs et subjectifs.**
+**Un panel d'experts a montré des préférences variées dans l'évaluation des productions juridiques (grammaire, exhaustivité, vocabulaire).**
+**La tolérance aux "erreurs acceptables" variait d'un participant à l'autre, soulignant la nature subjective de l'évaluation de la qualité.**
+**Alternatives pour certains termes :**
+*   **GenAI** : pourrait être remplacé par "IA générative" ou "IA générative de droit" (pour plus de précision)
+*   **Output** : pourrait être remplacé par "résultats", "productions" ou "documents produits" selon le contexte.
+*   **Comprehensiveness** : pourrait être remplacé par "l'étendue", "l'intégralité" ou "le caractère complet".
+La traduction choisie s'efforce d'être fidèle au sens original tout en utilisant un langage clair et précis, adapté au contexte juridique.</a:t>
             </a:r>
           </a:p>
         </p:txBody>
@@ -6260,8 +6391,23 @@
           </a:p>
           <a:p>
             <a:r>
-              <a:t>提案されるビジュアル：
-品質評価に影響を与える多様な要素を示すワードクラウド</a:t>
+              <a:t>Here are a few options for translating "Suggested Visual: Word cloud illustrating the diverse factors influencing quality assessment," depending on the nuance you want to convey:
+**Option 1 (Most straightforward and common):**
+*   **Suggestion visuelle : Nuage de mots illustrant les divers facteurs influençant l'évaluation de la qualité.**
+**Option 2 (Slightly more formal and emphasizes the suggestion):**
+*   **Visuel suggéré : Un nuage de mots illustrant les divers facteurs qui influencent l'évaluation de la qualité.**
+**Option 3 (Focuses on the visual as a recommendation):**
+*   **Recommandation visuelle : Un nuage de mots illustrant les divers facteurs influençant l'évaluation de la qualité.**
+**Explanation of Choices:**
+*   **"Suggestion visuelle"** is the most direct and common translation of "Suggested Visual."
+*   **"Visuel suggéré"** also works well and might be preferred in more formal contexts.
+*   **"Recommandation visuelle"** emphasizes that it's a recommendation for a visual aid.
+*   **"Nuage de mots"** is the standard French translation for "word cloud."
+*   **"Illustrant"** is a good translation of "illustrating."
+*   **"Les divers facteurs"** or **"les différents facteurs"** both work for "the diverse factors." I prefer "divers" here because it feels slightly broader.
+*   **"Influençant"** is the present participle of "influencer" (to influence), so it translates "influencing" well.
+*   **"L'évaluation de la qualité"** is the standard French translation for "quality assessment."
+I would recommend **Option 1** or **Option 2** as the most appropriate translations in most cases. Choose the one that best suits the overall tone and style of your document.</a:t>
             </a:r>
           </a:p>
         </p:txBody>
@@ -6290,7 +6436,7 @@
           <a:p/>
           <a:p>
             <a:r>
-              <a:t>申し訳ありませんが、あなたは翻訳するテキストを提供していません。「Translate the text from en into ja:」の後に、翻訳したい英語のテキストを入力してください。</a:t>
+              <a:t>Please provide the English text you would like me to translate into French. I need the text to be able to translate it.</a:t>
             </a:r>
           </a:p>
         </p:txBody>
@@ -6319,7 +6465,7 @@
           <a:p/>
           <a:p>
             <a:r>
-              <a:t>五 (go)</a:t>
+              <a:t>Cinq</a:t>
             </a:r>
           </a:p>
         </p:txBody>
@@ -6359,7 +6505,20 @@
           <a:p/>
           <a:p>
             <a:r>
-              <a:t>GenAIの広範な影響：法的業務を超えて</a:t>
+              <a:t>Here are a few options for translating "GenAI's Broader Impact: Beyond Legal Tasks," depending on the nuance you want to convey:
+**Option 1 (Most straightforward):**
+*   **L'impact plus large de l'IA générative : au-delà des tâches juridiques.**
+**Option 2 (Slightly more emphasis on the scope):**
+*   **La portée plus vaste de l'IA générative : au-delà des tâches juridiques.**
+**Option 3 (Emphasis on the idea of "going beyond"):**
+*   **L'impact de l'IA générative va au-delà des tâches juridiques.** (This is a little less direct, but very natural in French)
+**Option 4 (More formal, might be suitable for an academic context):**
+*   **L'incidence plus large de l'IA générative : au-delà du domaine juridique.**
+**Explanation of Choices:**
+*   **GenAI:** I've used "IA générative" which is the standard abbreviation/translation for Generative AI.
+*   **Broader Impact:** "Impact plus large" is the most direct translation. "Portée plus vaste" is also good, emphasizing the reach. "Incidence plus large" is more formal.
+*   **Beyond:** "Au-delà de" is the standard translation.
+The best option depends on the specific context.  If you're writing something formal, Option 4 might be best. If you want something clear and concise, Option 1 or 2 are good choices. Option 3 is a slightly more idiomatic and emphasizes that the impact is greater.</a:t>
             </a:r>
           </a:p>
         </p:txBody>
@@ -6381,11 +6540,17 @@
           <a:p/>
           <a:p>
             <a:r>
-              <a:t>GenAIは、法的業務にとどまらず、日常業務や将来への備えにも影響を与え、効率性と準備性を向上させます。
-*   会議の生産性向上（30分間の通話ごとに約10分の時間短縮）。
-*   業務の検証における「もう一人の目」として活用。
-*   回答者の61%が、GenAIの使用後、ワークロードの管理がより容易になったと感じています。
-*   88%が、GenAIの使用後、将来への備えがよりできたと感じています。</a:t>
+              <a:t>Voici une traduction possible du texte, en mettant l'accent sur la clarté et la précision :
+**L'IA générative améliore l'efficacité et la préparation au-delà des tâches juridiques, impactant le travail quotidien et la préparation future.**
+*   **Augmentation de la productivité des réunions (environ 10 minutes gagnées par appel de 30 minutes).**
+*   **Utilisée comme "une deuxième paire d'yeux" pour la vérification du travail.**
+*   **61% des répondants se sont sentis plus soutenus dans la gestion de leur charge de travail.**
+*   **88% se sont sentis mieux préparés pour l'avenir après avoir utilisé l'IA générative.**
+**Quelques alternatives pour certaines phrases, selon le contexte et le public cible:**
+*   **"Second pair of eyes" :**  On pourrait aussi utiliser "relecture supplémentaire" ou "vérification complémentaire".
+*   **"Future readiness" :** Selon le contexte, on pourrait aussi traduire par "capacité d'adaptation future" ou "préparation à l'avenir du travail".
+*  **"Felt more supported"**: Peut aussi se traduire par "se sont sentis plus épaulés".
+L'important est de choisir les termes qui correspondent le mieux à l'intention du texte original.</a:t>
             </a:r>
           </a:p>
         </p:txBody>
@@ -6435,8 +6600,21 @@
           </a:p>
           <a:p>
             <a:r>
-              <a:t>提案されるビジュアル：
-日常業務におけるGenAIの様々な応用を説明したマインドマップ。</a:t>
+              <a:t>Here are a few options for translating "Suggested Visual: A mind map illustrating the various applications of GenAI in daily work," with slightly different nuances:
+**Option 1 (Direct and common):**
+*   **Visuel suggéré : Un schéma heuristique illustrant les diverses applications de l'IA générative dans le travail quotidien.**
+    *   This is a straightforward and widely understood translation. "Schéma heuristique" is the standard term for "mind map" in French. "IA générative" is the standard abbreviation for "Generative AI".
+**Option 2 (More descriptive):**
+*   **Visuel proposé : Une carte mentale présentant les différentes applications de l'IA générative dans le travail quotidien.**
+    *   "Carte mentale" is another valid translation for "mind map," though "schéma heuristique" is often preferred in professional contexts. "Présentant" is a slightly more elegant way of saying "illustrant."
+**Option 3 (Emphasizing clarity):**
+*   **Suggestion de visuel : Une carte mentale détaillant les différentes applications de l'IA générative dans le travail quotidien.**
+    *   "Suggestion de visuel" is a slightly more formal way of saying "suggested visual."  "Détaillant" (detailing) emphasizes that the mind map should provide specific information.
+**Option 4 (More concise):**
+*   **Visuel recommandé : Schéma heuristique sur les applications de l'IA générative au quotidien professionnel.**
+    *   This is a more concise version, using "recommandé" (recommended) and "au quotidien professionnel" for "daily work." This loses a bit of the original nuance.
+**Which one is best depends on the specific context and your desired tone.**
+*   For most situations, **Option 1 (Visuel suggéré : Un schéma heuristique illustrant les diverses applications de l'IA générative dans le travail quotidien.)** is a solid choice.</a:t>
             </a:r>
           </a:p>
         </p:txBody>
@@ -6465,7 +6643,7 @@
           <a:p/>
           <a:p>
             <a:r>
-              <a:t>申し訳ありませんが、翻訳したい英文が提供されていません。翻訳したい英文を教えていただければ、翻訳いたします。</a:t>
+              <a:t>Please provide the text you would like me to translate from English into French. I need the English text to be able to do the translation.</a:t>
             </a:r>
           </a:p>
         </p:txBody>
@@ -6494,7 +6672,7 @@
           <a:p/>
           <a:p>
             <a:r>
-              <a:t>6 (数字の6)</a:t>
+              <a:t>Six</a:t>
             </a:r>
           </a:p>
         </p:txBody>
@@ -6534,7 +6712,17 @@
           <a:p/>
           <a:p>
             <a:r>
-              <a:t>「法的AIのギザギザなフロンティア」を乗り越える</a:t>
+              <a:t>Here are a few options for translating "Navigating the "Jagged Frontier" of Legal AI", depending on the nuance you want to convey:
+*   **Option 1 (Literal but effective):** Naviguer sur la "frontière accidentée" de l'IA juridique.
+*   **Option 2 (More evocative):** Explorer les "terrains accidentés" de l'IA juridique.
+*   **Option 3 (Emphasizing challenges):** Surmonter les défis de la "frontière accidentée" de l'IA juridique.
+*   **Option 4 (Focus on the novelty and uncertainty):** Apprivoiser la "frontière incertaine" de l'IA juridique.
+**Explanation of Choices:**
+*   **"Frontière accidentée"** (Option 1) is a direct translation of "Jagged Frontier". It conveys the image of something rough, uneven, and potentially dangerous.
+*   **"Terrains accidentés"** (Option 2) replaces "frontier" with "terrains" (grounds/territory). It can suggest the different facets and aspects of Legal AI.
+*   **"Surmonter les défis"** (Option 3) focuses on the challenges that the "Jagged Frontier" represents.
+*   **"Frontière incertaine"** (Option 4) replaces the jagged aspect with uncertainty, highlighting the unknown nature of Legal AI.
+The best choice depends on the specific context of the title and what you want to emphasize. If you want to maintain the imagery of a "frontier", options 1 and 4 are more suitable. If you want to emphasize the difficulties and challenges, option 3 might be better. If you prefer a broader approach, option 2 would be a good choice.</a:t>
             </a:r>
           </a:p>
         </p:txBody>
@@ -6556,10 +6744,23 @@
           <a:p/>
           <a:p>
             <a:r>
-              <a:t>GenAIの導入を成功させるには、その能力と限界を理解するための戦略的なアプローチが必要です。
-GenAIの能力は一様ではありません（「ギザギザのフロンティア」）。
-単にユースケースを特定するだけでは不十分であり、焦点を絞った関与とトレーニングが不可欠です。
-試行の結果、デジタルリテラシーと開発サポートの必要性が明らかになりました。</a:t>
+              <a:t>Here's a translation of the text, aiming for clarity and accuracy:
+**Une adoption réussie de la GenAI exige une approche stratégique pour comprendre ses capacités et ses limites.**
+**Les capacités de la GenAI sont inégales (frontière "irrégulière").**
+**Il ne suffit pas d'identifier les cas d'utilisation ; un engagement ciblé et une formation sont essentiels.**
+**L'essai a révélé un besoin de littératie numérique et de soutien au développement.**
+Here's a breakdown of why I chose these specific words:
+*   **GenAI:** I've kept it as "GenAI" as it is the standard abbreviation. Some might use "IA générative," but "GenAI" is becoming more common, especially in technical contexts.
+*   **Une adoption réussie... exige:**  This translates "Successful adoption requires" in a formal, business-oriented way.
+*   **Approche stratégique:** This is a straightforward translation of "strategic approach."
+*   **Comprendre ses capacités et ses limites:** A precise translation.
+*   **Inégales (frontière "irrégulière"):** "Inégales" is a simple and understandable way to say "uneven". I kept "irrégulière" in quotation marks to show that it translates "jagged," offering a literal term while maintaining the essence of unevenness.
+*   **Il ne suffit pas de...:** This translates "Simply identifying use cases is insufficient" effectively.
+*   **Engagement ciblé et formation:**  This accurately translates "focused engagement and training".
+*   **Essentiels:** This translates "crucial" effectively.
+*   **L'essai a révélé:** "Trial revealed" is well-translated by "L'essai a révélé".
+*   **Littératie numérique et soutien au développement:**  "Digital literacy and development support" are accurately translated.
+This translation aims to be clear, accurate, and suitable for a professional or business context.</a:t>
             </a:r>
           </a:p>
         </p:txBody>
@@ -6609,8 +6810,21 @@
           </a:p>
           <a:p>
             <a:r>
-              <a:t>提案されたビジュアル：
-GenAI の不均一な能力を示す「ギザギザのフロンティア」のグラフィカルな表現。</a:t>
+              <a:t>Here are a few options, depending on the nuance you want to convey:
+**Option 1 (Simple and direct):**
+*   **Visuel suggéré :** Une représentation graphique d'une "frontière dentelée," illustrant les capacités inégales de la GenAI.
+**Option 2 (More descriptive):**
+*   **Visuel suggéré :** Un graphique représentant une "frontière irrégulière" (ou "en dents de scie"), pour illustrer les forces et les faiblesses des capacités de l'IA générative.
+**Option 3 (Focus on unevenness):**
+*   **Visuel suggéré :** Une illustration d'une "frontière inégale," symbolisant la variabilité des performances de l'IA générative.
+**Option 4 (Slightly more creative):**
+*   **Visuel suggéré :** Une image représentant une "frontière accidentée" (or "escarpée"), pour visualiser les performances variables et les lacunes de l'IA générative.
+**Explanation of choices:**
+*   **"Frontière dentelée"** is a very literal translation of "jagged frontier." It's accurate but may not resonate as strongly in French.
+*   **"Frontière irrégulière"** (or "en dents de scie") is a more common and natural way to describe a jagged edge in French.
+*   **"Frontière inégale"** emphasizes the unevenness of the capabilities.
+*   **"Frontière accidentée"** (or "escarpée") suggests a rough, uneven terrain, metaphorically representing the challenges and inconsistencies of GenAI.
+The best option depends on the specific context and the desired impact. I would lean towards **Option 2** as it's clear, descriptive, and uses a common idiom.</a:t>
             </a:r>
           </a:p>
         </p:txBody>
@@ -6639,7 +6853,7 @@
           <a:p/>
           <a:p>
             <a:r>
-              <a:t>申し訳ありませんが、翻訳する英語のテキストが提供されていません。テキストを入力していただければ、翻訳いたします。</a:t>
+              <a:t>Please provide the English text you would like me to translate into French. I need the text to be able to translate it accurately.</a:t>
             </a:r>
           </a:p>
         </p:txBody>
@@ -6668,7 +6882,7 @@
           <a:p/>
           <a:p>
             <a:r>
-              <a:t>7 (しち/なな)</a:t>
+              <a:t>sept</a:t>
             </a:r>
           </a:p>
         </p:txBody>
@@ -6708,14 +6922,11 @@
           <a:p/>
           <a:p>
             <a:r>
-              <a:t>Ashurstのトライアル・メソドロジー：マルチモーダル・アプローチ
-または、
-アシャーストの訴訟手法：マルチモーダル・アプローチ
-（文脈によって、カタカナ表記の「アシャースト」を「芦村（あしむら）」のような人名にすることも考えられますが、一般的には法律事務所の名前である可能性が高いので、上記二つの訳が適切でしょう。）
-ポイント：
-*   "Trial Methodology" は「裁判手法」「訴訟手法」「トライアル・メソドロジー」などと訳せます。
-*   "Multi-Modal Approach" は「マルチモーダル・アプローチ」と訳すのが一般的です。複数の様式や方法を組み合わせるアプローチ、という意味合いです。
-文脈がわかれば、より自然な日本語に翻訳できます。例えば、法律事務所の記事や文書であれば、「アシャーストの訴訟戦略：マルチモーダル・アプローチ」のように、より具体的な表現を用いることも可能です。</a:t>
+              <a:t>Here are a few options for translating "Ashurst's Trial Methodology: A Multi-Modal Approach", depending on the nuances you want to convey:
+*   **Méthodologie de procès d'Ashurst : une approche multimodale** (This is a straightforward and generally accurate translation. It keeps the original wording closely and is suitable for formal contexts.)
+*   **La méthodologie d'Ashurst en matière de procès : une approche multimodale** (This is another good, formal option.)
+*   **Méthodologie de procès Ashurst : une approche multimodale** (This is slightly less formal, omitting the possessive "d'")
+Which one you choose depends on the specific context. I would lean towards the first two for professional documents.</a:t>
             </a:r>
           </a:p>
         </p:txBody>
@@ -6737,10 +6948,31 @@
           <a:p/>
           <a:p>
             <a:r>
-              <a:t>アシューストは、GenAIの影響に関する包括的なデータを収集するために、堅牢で多岐にわたるアプローチを採用しました。
-*   人間とGenAIが生成した判例要約を比較するブラインド調査。
-*   特定の法的タスクに合わせて調整された管理された実験。
-*   定性的なデータを収集するためのフィードバック調査とコミュニティフォーラム。</a:t>
+              <a:t>Here are a few options for translating the provided text, with slightly different nuances:
+**Option 1 (Focus on clarity and action):**
+Ashurst a utilisé une approche multimodale et rigoureuse pour recueillir des données complètes sur l'impact de l'IA générative.
+*   Étude à l'aveugle comparant des résumés de cas produits par des humains et par l'IA générative.
+*   Expériences contrôlées, conçues sur mesure pour des tâches juridiques spécifiques.
+*   Enquêtes de satisfaction et forums communautaires pour recueillir des données qualitatives.
+**Option 2 (More emphasis on the type of approach):**
+Ashurst a adopté une approche multimodale solide pour collecter des données exhaustives sur l'impact de l'IA générative.
+*   Étude en aveugle comparant des résumés de cas rédigés par des humains et par l'IA générative.
+*   Expérimentations contrôlées, adaptées à des tâches juridiques précises.
+*   Sondages et forums communautaires pour recueillir des données qualitatives.
+**Option 3 (Formal and professional):**
+Afin de recueillir des données exhaustives sur l'impact de l'IA générative, Ashurst a mis en œuvre une approche multimodale solide.
+*   Réalisation d'une étude en aveugle comparant des synthèses de jurisprudence produites par des humains et par l'IA générative.
+*   Mise en place d'expérimentations contrôlées et adaptées à des tâches juridiques spécifiques.
+*   Utilisation de questionnaires de satisfaction et de forums communautaires pour collecter des données qualitatives.
+**Key Differences &amp; Considerations:**
+*   **"Robust"**:  "Rigoureuse", "solide" or "approfondie" are all good translations. "Rigoureuse" emphasizes the thoroughness, "solide" emphasizes the strength, and "approfondie" emphasizes the depth of the approach.
+*   **"Multi-modal"**: This translates well directly as "multimodale."
+*   **"Tailored"**:  "Conçues sur mesure" (designed to measure) or "adaptées" (adapted) both work. "Adaptées" might be slightly more natural in this context.
+*   **"Feedback surveys"**: "Enquêtes de satisfaction", "Sondages" or "Questionnaires de satisfaction" are all possible. The best choice depends on the formality desired.
+*   **"Community forums"**: Translates directly to "forums communautaires".
+*   **"GenAI"**: Although commonly used in English, it might be clearer to say "IA générative" (Generative AI) for a French audience who may not be as familiar with the abbreviation.
+*  "Case summaries": "Résumés de cas" (case summaries), "synthèses de jurisprudence" (legal case summaries).
+Choose the option that best suits the tone and style of your document.  I would lean towards Option 1 or 2 for most business contexts. If it's a formal legal document, Option 3 might be better.</a:t>
             </a:r>
           </a:p>
         </p:txBody>
@@ -6790,14 +7022,25 @@
           </a:p>
           <a:p>
             <a:r>
-              <a:t>**日本語訳:**
-**おすすめのビジュアル:**
-盲検試験、対照実験、フィードバックという三方向からのアプローチを示すフローチャート
-**解説:**
-*   **盲検試験 (blind study):** これは、被験者が自分がどのグループに属しているか（例えば、薬を投与されているか、プラセボを投与されているか）を知らない試験方法です。
-*   **対照実験 (controlled experiments):** これは、特定の変数を操作して、その変数が結果に与える影響を調べる実験です。対照群を設けることで、操作した変数の効果を明確にすることができます。
-*   **フィードバック (feedback):** これは、結果に基づいて改善を行うための情報です。
-この三つの要素をフローチャートで示すことで、研究のプロセスや相互関係を視覚的に理解しやすくすることができます。</a:t>
+              <a:t>Here are a few options, depending on the nuance you want to convey:
+**Option 1 (Most Direct):**
+&gt; Représentation visuelle suggérée :
+&gt; Organigramme illustrant l'approche à trois volets (étude à l'aveugle, expériences contrôlées, feedback).
+**Option 2 (Slightly More Emphasis on the Visual):**
+&gt; Proposition de visuel :
+&gt; Organigramme illustrant l'approche à trois volets (étude à l'aveugle, expériences contrôlées, feedback).
+**Option 3 (More Formal):**
+&gt; Suggestion de présentation visuelle :
+&gt; Un organigramme illustrant l'approche en trois étapes (étude à l'aveugle, expériences contrôlées, rétroaction/retours).
+**Why I Chose These:**
+*   **"Représentation visuelle suggérée" / "Proposition de visuel" / "Suggestion de présentation visuelle"**: These translate "Suggested Visual" directly and are commonly used.
+*   **"Organigramme"**: This is the standard translation for "Flowchart."
+*   **"Illustrant"**: Clear and straightforward translation of "illustrating."
+*   **"Approche à trois volets/en trois étapes"**: Both are acceptable translations of "three-pronged approach."  "Volets" implies different aspects or sections, while "étapes" suggests a sequential order, but in this context, they're largely interchangeable.
+*   **"Étude à l'aveugle"**: The common and accurate translation for "blind study."
+*   **"Expériences contrôlées"**: The standard translation for "controlled experiments."
+*   **"Feedback" / "Rétroaction/Retours"**: "Feedback" is often used directly in French, but "rétroaction" and "retours" are good alternatives. "Rétroaction" is more formal.
+Choose the option that best suits the overall tone and style of your document. If you are aiming for a more formal or academic context, "Suggestion de présentation visuelle" and "rétroaction" are better choices. For a more casual or general audience, "Représentation visuelle suggérée" and "feedback" are perfectly acceptable.</a:t>
             </a:r>
           </a:p>
         </p:txBody>
@@ -6826,7 +7069,7 @@
           <a:p/>
           <a:p>
             <a:r>
-              <a:t>申し訳ありませんが、翻訳するテキストが提供されていません。テキストを入力してください。</a:t>
+              <a:t>Please provide the English text you would like me to translate into French. I need the English text to be able to translate it for you.</a:t>
             </a:r>
           </a:p>
         </p:txBody>
@@ -6855,7 +7098,7 @@
           <a:p/>
           <a:p>
             <a:r>
-              <a:t>8 は日本語で **八 (はち)** と訳されます。</a:t>
+              <a:t>Huit</a:t>
             </a:r>
           </a:p>
         </p:txBody>
@@ -6895,7 +7138,12 @@
           <a:p/>
           <a:p>
             <a:r>
-              <a:t>GenAI試験運用のための主要な推奨事項</a:t>
+              <a:t>Here are a few options for translating "Key Recommendations for GenAI Trials", depending on the nuance you want to convey:
+*   **Recommandations clés pour les essais d'IA générative:** This is a direct and commonly used translation.
+*   **Principales recommandations pour les essais d'IA générative:** This is also a good, direct translation, using "principales" which means "main" or "principal".
+*   **Recommandations essentielles pour les essais d'IA générative:** This uses "essentielles" to emphasize the critical importance of the recommendations.
+*   **Recommandations fondamentales pour les essais d'IA générative:** This uses "fondamentales" which means fundamental or basic.
+The best choice will depend on the overall context. I would generally recommend the first option, "Recommandations clés pour les essais d'IA générative," unless you want to emphasize the importance or fundamental nature of the recommendations.</a:t>
             </a:r>
           </a:p>
         </p:txBody>
@@ -6917,12 +7165,13 @@
           <a:p/>
           <a:p>
             <a:r>
-              <a:t>成功するGenAIの試行には、注意深い計画、関与、そしてユーザーエクスペリエンスへの注力が必要です。
-*   参加者が容易に関与できるような試行活動と環境を設計する。
-*   適切な安全対策を講じた上で、GenAIツールへの直接的なアクセスを提供する。
-*   試行のリーダーを選任し、プロセスを導き、多様な参加を促す。
-*   「何ができるか」を探求するためのセッションを実施する。
-*   参加意欲を高めるために、友好的な競争を設ける。</a:t>
+              <a:t>Voici une traduction possible du texte :
+Des essais réussis de GenAI (Intelligence Artificielle Générative) nécessitent une planification minutieuse, un engagement fort et une attention particulière à l'expérience utilisateur.
+Concevez les activités et l'environnement de l'essai de manière à faciliter l'engagement des participants.
+Fournissez un accès direct aux outils de GenAI avec les protections appropriées.
+Utilisez des chefs de projet pour guider le processus et garantir une participation diversifiée.
+Organisez des sessions "l'art du possible" pour explorer les applications.
+Créez une compétition amicale pour accroître l'engagement.</a:t>
             </a:r>
           </a:p>
         </p:txBody>
@@ -6972,8 +7221,19 @@
           </a:p>
           <a:p>
             <a:r>
-              <a:t>提案されるビジュアル：
-関連するアイコン付きのおすすめリスト</a:t>
+              <a:t>Here are a few options, depending on the context and desired nuance:
+**Option 1 (Most straightforward):**
+*   **Visuel suggéré :** Liste de recommandations avec des icônes pertinentes.
+**Option 2 (Slightly more descriptive):**
+*   **Suggestion visuelle :** Une liste de recommandations, accompagnée d'icônes appropriées.
+**Option 3 (Emphasizing the visual element):**
+*   **Éléments visuels suggérés :** Liste de recommandations avec les icônes associées.
+**Explanation of choices:**
+*   **Visuel/Éléments visuels:** Both are good translations of "Visual." "Éléments visuels" is a bit more formal.
+*   **Recommandations:** The standard translation for "recommendations."
+*   **Pertinentes/Appropriées/Associées:**  All mean "relevant." "Pertinentes" is a good general choice. "Appropriées" implies suitability. "Associées" suggests a direct connection or pairing.
+**Therefore, I would recommend Option 1:  Visuel suggéré : Liste de recommandations avec des icônes pertinentes.**
+Choose the option that best fits the overall style and context of your document.</a:t>
             </a:r>
           </a:p>
         </p:txBody>
@@ -7002,7 +7262,17 @@
           <a:p/>
           <a:p>
             <a:r>
-              <a:t>申し訳ありませんが、翻訳する元のテキストが提供されていません。翻訳したい英語のテキストを教えてください。</a:t>
+              <a:t>Here are a few options for translating "Generated by AI Presentation Builder" into French, depending on the specific nuance you want to convey:
+**Most Common &amp; Literal:**
+*   **Généré par AI Presentation Builder** - This is the most straightforward and widely understood translation. It keeps the English name "AI Presentation Builder" as is, which is common for brand names.
+**Slightly More Formal:**
+*   **Produit par AI Presentation Builder** - This uses "produit" which means "produced" or "created."
+**Emphasizing Creation:**
+*   **Créé par AI Presentation Builder** - This uses "créé," which means "created."
+**If you want to emphasize that the tool is what generated it (instead of a person):**
+*   **Généré automatiquement par AI Presentation Builder** - This adds "automatiquement" (automatically).
+**Which one is best for you?**
+I would recommend **"Généré par AI Presentation Builder"** as it's the most common and easily understood.  It maintains the recognizable brand name.  The others are good options if you want to subtly emphasize a different aspect of the generation process.</a:t>
             </a:r>
           </a:p>
         </p:txBody>
@@ -7031,10 +7301,7 @@
           <a:p/>
           <a:p>
             <a:r>
-              <a:t>9 （きゅう）
-or
-９ （きゅう）
-Both are valid translations of "9" into Japanese. The first uses the Japanese Hiragana character, while the second uses the full-width digit. Choose whichever suits the context.</a:t>
+              <a:t>Neuf</a:t>
             </a:r>
           </a:p>
         </p:txBody>

</xml_diff>